<commit_message>
feat: add several logger implementations
</commit_message>
<xml_diff>
--- a/metarhia/solid/dip/2_di/diagram.pptx
+++ b/metarhia/solid/dip/2_di/diagram.pptx
@@ -4,6 +4,9 @@
   <p:sldMasterIdLst>
     <p:sldMasterId id="2147483648" r:id="rId1"/>
   </p:sldMasterIdLst>
+  <p:notesMasterIdLst>
+    <p:notesMasterId r:id="rId3"/>
+  </p:notesMasterIdLst>
   <p:sldIdLst>
     <p:sldId id="256" r:id="rId2"/>
   </p:sldIdLst>
@@ -112,6 +115,440 @@
 </p:presentation>
 </file>
 
+<file path=ppt/notesMasters/notesMaster1.xml><?xml version="1.0" encoding="utf-8"?>
+<p:notesMaster xmlns:a="http://schemas.openxmlformats.org/drawingml/2006/main" xmlns:r="http://schemas.openxmlformats.org/officeDocument/2006/relationships" xmlns:p="http://schemas.openxmlformats.org/presentationml/2006/main">
+  <p:cSld>
+    <p:bg>
+      <p:bgRef idx="1001">
+        <a:schemeClr val="bg1"/>
+      </p:bgRef>
+    </p:bg>
+    <p:spTree>
+      <p:nvGrpSpPr>
+        <p:cNvPr id="1" name=""/>
+        <p:cNvGrpSpPr/>
+        <p:nvPr/>
+      </p:nvGrpSpPr>
+      <p:grpSpPr>
+        <a:xfrm>
+          <a:off x="0" y="0"/>
+          <a:ext cx="0" cy="0"/>
+          <a:chOff x="0" y="0"/>
+          <a:chExt cx="0" cy="0"/>
+        </a:xfrm>
+      </p:grpSpPr>
+      <p:sp>
+        <p:nvSpPr>
+          <p:cNvPr id="2" name="Header Placeholder 1"/>
+          <p:cNvSpPr>
+            <a:spLocks noGrp="1"/>
+          </p:cNvSpPr>
+          <p:nvPr>
+            <p:ph type="hdr" sz="quarter"/>
+          </p:nvPr>
+        </p:nvSpPr>
+        <p:spPr>
+          <a:xfrm>
+            <a:off x="0" y="0"/>
+            <a:ext cx="2971800" cy="458788"/>
+          </a:xfrm>
+          <a:prstGeom prst="rect">
+            <a:avLst/>
+          </a:prstGeom>
+        </p:spPr>
+        <p:txBody>
+          <a:bodyPr vert="horz" lIns="91440" tIns="45720" rIns="91440" bIns="45720" rtlCol="0"/>
+          <a:lstStyle>
+            <a:lvl1pPr algn="l">
+              <a:defRPr sz="1200"/>
+            </a:lvl1pPr>
+          </a:lstStyle>
+          <a:p>
+            <a:endParaRPr lang="ru-RU"/>
+          </a:p>
+        </p:txBody>
+      </p:sp>
+      <p:sp>
+        <p:nvSpPr>
+          <p:cNvPr id="3" name="Date Placeholder 2"/>
+          <p:cNvSpPr>
+            <a:spLocks noGrp="1"/>
+          </p:cNvSpPr>
+          <p:nvPr>
+            <p:ph type="dt" idx="1"/>
+          </p:nvPr>
+        </p:nvSpPr>
+        <p:spPr>
+          <a:xfrm>
+            <a:off x="3884613" y="0"/>
+            <a:ext cx="2971800" cy="458788"/>
+          </a:xfrm>
+          <a:prstGeom prst="rect">
+            <a:avLst/>
+          </a:prstGeom>
+        </p:spPr>
+        <p:txBody>
+          <a:bodyPr vert="horz" lIns="91440" tIns="45720" rIns="91440" bIns="45720" rtlCol="0"/>
+          <a:lstStyle>
+            <a:lvl1pPr algn="r">
+              <a:defRPr sz="1200"/>
+            </a:lvl1pPr>
+          </a:lstStyle>
+          <a:p>
+            <a:fld id="{BEC48C54-449B-4B1B-A7F1-79F38C887D9E}" type="datetimeFigureOut">
+              <a:rPr lang="ru-RU" smtClean="0"/>
+              <a:t>11.12.2024</a:t>
+            </a:fld>
+            <a:endParaRPr lang="ru-RU"/>
+          </a:p>
+        </p:txBody>
+      </p:sp>
+      <p:sp>
+        <p:nvSpPr>
+          <p:cNvPr id="4" name="Slide Image Placeholder 3"/>
+          <p:cNvSpPr>
+            <a:spLocks noGrp="1" noRot="1" noChangeAspect="1"/>
+          </p:cNvSpPr>
+          <p:nvPr>
+            <p:ph type="sldImg" idx="2"/>
+          </p:nvPr>
+        </p:nvSpPr>
+        <p:spPr>
+          <a:xfrm>
+            <a:off x="685800" y="1143000"/>
+            <a:ext cx="5486400" cy="3086100"/>
+          </a:xfrm>
+          <a:prstGeom prst="rect">
+            <a:avLst/>
+          </a:prstGeom>
+          <a:noFill/>
+          <a:ln w="12700">
+            <a:solidFill>
+              <a:prstClr val="black"/>
+            </a:solidFill>
+          </a:ln>
+        </p:spPr>
+        <p:txBody>
+          <a:bodyPr vert="horz" lIns="91440" tIns="45720" rIns="91440" bIns="45720" rtlCol="0" anchor="ctr"/>
+          <a:lstStyle/>
+          <a:p>
+            <a:endParaRPr lang="ru-RU"/>
+          </a:p>
+        </p:txBody>
+      </p:sp>
+      <p:sp>
+        <p:nvSpPr>
+          <p:cNvPr id="5" name="Notes Placeholder 4"/>
+          <p:cNvSpPr>
+            <a:spLocks noGrp="1"/>
+          </p:cNvSpPr>
+          <p:nvPr>
+            <p:ph type="body" sz="quarter" idx="3"/>
+          </p:nvPr>
+        </p:nvSpPr>
+        <p:spPr>
+          <a:xfrm>
+            <a:off x="685800" y="4400550"/>
+            <a:ext cx="5486400" cy="3600450"/>
+          </a:xfrm>
+          <a:prstGeom prst="rect">
+            <a:avLst/>
+          </a:prstGeom>
+        </p:spPr>
+        <p:txBody>
+          <a:bodyPr vert="horz" lIns="91440" tIns="45720" rIns="91440" bIns="45720" rtlCol="0"/>
+          <a:lstStyle/>
+          <a:p>
+            <a:pPr lvl="0"/>
+            <a:r>
+              <a:rPr lang="en-US"/>
+              <a:t>Click to edit Master text styles</a:t>
+            </a:r>
+          </a:p>
+          <a:p>
+            <a:pPr lvl="1"/>
+            <a:r>
+              <a:rPr lang="en-US"/>
+              <a:t>Second level</a:t>
+            </a:r>
+          </a:p>
+          <a:p>
+            <a:pPr lvl="2"/>
+            <a:r>
+              <a:rPr lang="en-US"/>
+              <a:t>Third level</a:t>
+            </a:r>
+          </a:p>
+          <a:p>
+            <a:pPr lvl="3"/>
+            <a:r>
+              <a:rPr lang="en-US"/>
+              <a:t>Fourth level</a:t>
+            </a:r>
+          </a:p>
+          <a:p>
+            <a:pPr lvl="4"/>
+            <a:r>
+              <a:rPr lang="en-US"/>
+              <a:t>Fifth level</a:t>
+            </a:r>
+            <a:endParaRPr lang="ru-RU"/>
+          </a:p>
+        </p:txBody>
+      </p:sp>
+      <p:sp>
+        <p:nvSpPr>
+          <p:cNvPr id="6" name="Footer Placeholder 5"/>
+          <p:cNvSpPr>
+            <a:spLocks noGrp="1"/>
+          </p:cNvSpPr>
+          <p:nvPr>
+            <p:ph type="ftr" sz="quarter" idx="4"/>
+          </p:nvPr>
+        </p:nvSpPr>
+        <p:spPr>
+          <a:xfrm>
+            <a:off x="0" y="8685213"/>
+            <a:ext cx="2971800" cy="458787"/>
+          </a:xfrm>
+          <a:prstGeom prst="rect">
+            <a:avLst/>
+          </a:prstGeom>
+        </p:spPr>
+        <p:txBody>
+          <a:bodyPr vert="horz" lIns="91440" tIns="45720" rIns="91440" bIns="45720" rtlCol="0" anchor="b"/>
+          <a:lstStyle>
+            <a:lvl1pPr algn="l">
+              <a:defRPr sz="1200"/>
+            </a:lvl1pPr>
+          </a:lstStyle>
+          <a:p>
+            <a:endParaRPr lang="ru-RU"/>
+          </a:p>
+        </p:txBody>
+      </p:sp>
+      <p:sp>
+        <p:nvSpPr>
+          <p:cNvPr id="7" name="Slide Number Placeholder 6"/>
+          <p:cNvSpPr>
+            <a:spLocks noGrp="1"/>
+          </p:cNvSpPr>
+          <p:nvPr>
+            <p:ph type="sldNum" sz="quarter" idx="5"/>
+          </p:nvPr>
+        </p:nvSpPr>
+        <p:spPr>
+          <a:xfrm>
+            <a:off x="3884613" y="8685213"/>
+            <a:ext cx="2971800" cy="458787"/>
+          </a:xfrm>
+          <a:prstGeom prst="rect">
+            <a:avLst/>
+          </a:prstGeom>
+        </p:spPr>
+        <p:txBody>
+          <a:bodyPr vert="horz" lIns="91440" tIns="45720" rIns="91440" bIns="45720" rtlCol="0" anchor="b"/>
+          <a:lstStyle>
+            <a:lvl1pPr algn="r">
+              <a:defRPr sz="1200"/>
+            </a:lvl1pPr>
+          </a:lstStyle>
+          <a:p>
+            <a:fld id="{ABE4E841-BA16-44AC-AB2C-E0471073EDA2}" type="slidenum">
+              <a:rPr lang="ru-RU" smtClean="0"/>
+              <a:t>‹#›</a:t>
+            </a:fld>
+            <a:endParaRPr lang="ru-RU"/>
+          </a:p>
+        </p:txBody>
+      </p:sp>
+    </p:spTree>
+    <p:extLst>
+      <p:ext uri="{BB962C8B-B14F-4D97-AF65-F5344CB8AC3E}">
+        <p14:creationId xmlns:p14="http://schemas.microsoft.com/office/powerpoint/2010/main" val="3159269553"/>
+      </p:ext>
+    </p:extLst>
+  </p:cSld>
+  <p:clrMap bg1="lt1" tx1="dk1" bg2="lt2" tx2="dk2" accent1="accent1" accent2="accent2" accent3="accent3" accent4="accent4" accent5="accent5" accent6="accent6" hlink="hlink" folHlink="folHlink"/>
+  <p:notesStyle>
+    <a:lvl1pPr marL="0" algn="l" defTabSz="914400" rtl="0" eaLnBrk="1" latinLnBrk="0" hangingPunct="1">
+      <a:defRPr sz="1200" kern="1200">
+        <a:solidFill>
+          <a:schemeClr val="tx1"/>
+        </a:solidFill>
+        <a:latin typeface="+mn-lt"/>
+        <a:ea typeface="+mn-ea"/>
+        <a:cs typeface="+mn-cs"/>
+      </a:defRPr>
+    </a:lvl1pPr>
+    <a:lvl2pPr marL="457200" algn="l" defTabSz="914400" rtl="0" eaLnBrk="1" latinLnBrk="0" hangingPunct="1">
+      <a:defRPr sz="1200" kern="1200">
+        <a:solidFill>
+          <a:schemeClr val="tx1"/>
+        </a:solidFill>
+        <a:latin typeface="+mn-lt"/>
+        <a:ea typeface="+mn-ea"/>
+        <a:cs typeface="+mn-cs"/>
+      </a:defRPr>
+    </a:lvl2pPr>
+    <a:lvl3pPr marL="914400" algn="l" defTabSz="914400" rtl="0" eaLnBrk="1" latinLnBrk="0" hangingPunct="1">
+      <a:defRPr sz="1200" kern="1200">
+        <a:solidFill>
+          <a:schemeClr val="tx1"/>
+        </a:solidFill>
+        <a:latin typeface="+mn-lt"/>
+        <a:ea typeface="+mn-ea"/>
+        <a:cs typeface="+mn-cs"/>
+      </a:defRPr>
+    </a:lvl3pPr>
+    <a:lvl4pPr marL="1371600" algn="l" defTabSz="914400" rtl="0" eaLnBrk="1" latinLnBrk="0" hangingPunct="1">
+      <a:defRPr sz="1200" kern="1200">
+        <a:solidFill>
+          <a:schemeClr val="tx1"/>
+        </a:solidFill>
+        <a:latin typeface="+mn-lt"/>
+        <a:ea typeface="+mn-ea"/>
+        <a:cs typeface="+mn-cs"/>
+      </a:defRPr>
+    </a:lvl4pPr>
+    <a:lvl5pPr marL="1828800" algn="l" defTabSz="914400" rtl="0" eaLnBrk="1" latinLnBrk="0" hangingPunct="1">
+      <a:defRPr sz="1200" kern="1200">
+        <a:solidFill>
+          <a:schemeClr val="tx1"/>
+        </a:solidFill>
+        <a:latin typeface="+mn-lt"/>
+        <a:ea typeface="+mn-ea"/>
+        <a:cs typeface="+mn-cs"/>
+      </a:defRPr>
+    </a:lvl5pPr>
+    <a:lvl6pPr marL="2286000" algn="l" defTabSz="914400" rtl="0" eaLnBrk="1" latinLnBrk="0" hangingPunct="1">
+      <a:defRPr sz="1200" kern="1200">
+        <a:solidFill>
+          <a:schemeClr val="tx1"/>
+        </a:solidFill>
+        <a:latin typeface="+mn-lt"/>
+        <a:ea typeface="+mn-ea"/>
+        <a:cs typeface="+mn-cs"/>
+      </a:defRPr>
+    </a:lvl6pPr>
+    <a:lvl7pPr marL="2743200" algn="l" defTabSz="914400" rtl="0" eaLnBrk="1" latinLnBrk="0" hangingPunct="1">
+      <a:defRPr sz="1200" kern="1200">
+        <a:solidFill>
+          <a:schemeClr val="tx1"/>
+        </a:solidFill>
+        <a:latin typeface="+mn-lt"/>
+        <a:ea typeface="+mn-ea"/>
+        <a:cs typeface="+mn-cs"/>
+      </a:defRPr>
+    </a:lvl7pPr>
+    <a:lvl8pPr marL="3200400" algn="l" defTabSz="914400" rtl="0" eaLnBrk="1" latinLnBrk="0" hangingPunct="1">
+      <a:defRPr sz="1200" kern="1200">
+        <a:solidFill>
+          <a:schemeClr val="tx1"/>
+        </a:solidFill>
+        <a:latin typeface="+mn-lt"/>
+        <a:ea typeface="+mn-ea"/>
+        <a:cs typeface="+mn-cs"/>
+      </a:defRPr>
+    </a:lvl8pPr>
+    <a:lvl9pPr marL="3657600" algn="l" defTabSz="914400" rtl="0" eaLnBrk="1" latinLnBrk="0" hangingPunct="1">
+      <a:defRPr sz="1200" kern="1200">
+        <a:solidFill>
+          <a:schemeClr val="tx1"/>
+        </a:solidFill>
+        <a:latin typeface="+mn-lt"/>
+        <a:ea typeface="+mn-ea"/>
+        <a:cs typeface="+mn-cs"/>
+      </a:defRPr>
+    </a:lvl9pPr>
+  </p:notesStyle>
+</p:notesMaster>
+</file>
+
+<file path=ppt/notesSlides/notesSlide1.xml><?xml version="1.0" encoding="utf-8"?>
+<p:notes xmlns:a="http://schemas.openxmlformats.org/drawingml/2006/main" xmlns:r="http://schemas.openxmlformats.org/officeDocument/2006/relationships" xmlns:p="http://schemas.openxmlformats.org/presentationml/2006/main">
+  <p:cSld>
+    <p:spTree>
+      <p:nvGrpSpPr>
+        <p:cNvPr id="1" name=""/>
+        <p:cNvGrpSpPr/>
+        <p:nvPr/>
+      </p:nvGrpSpPr>
+      <p:grpSpPr>
+        <a:xfrm>
+          <a:off x="0" y="0"/>
+          <a:ext cx="0" cy="0"/>
+          <a:chOff x="0" y="0"/>
+          <a:chExt cx="0" cy="0"/>
+        </a:xfrm>
+      </p:grpSpPr>
+      <p:sp>
+        <p:nvSpPr>
+          <p:cNvPr id="2" name="Slide Image Placeholder 1"/>
+          <p:cNvSpPr>
+            <a:spLocks noGrp="1" noRot="1" noChangeAspect="1"/>
+          </p:cNvSpPr>
+          <p:nvPr>
+            <p:ph type="sldImg"/>
+          </p:nvPr>
+        </p:nvSpPr>
+        <p:spPr/>
+      </p:sp>
+      <p:sp>
+        <p:nvSpPr>
+          <p:cNvPr id="3" name="Notes Placeholder 2"/>
+          <p:cNvSpPr>
+            <a:spLocks noGrp="1"/>
+          </p:cNvSpPr>
+          <p:nvPr>
+            <p:ph type="body" idx="1"/>
+          </p:nvPr>
+        </p:nvSpPr>
+        <p:spPr/>
+        <p:txBody>
+          <a:bodyPr/>
+          <a:lstStyle/>
+          <a:p>
+            <a:endParaRPr lang="ru-RU"/>
+          </a:p>
+        </p:txBody>
+      </p:sp>
+      <p:sp>
+        <p:nvSpPr>
+          <p:cNvPr id="4" name="Slide Number Placeholder 3"/>
+          <p:cNvSpPr>
+            <a:spLocks noGrp="1"/>
+          </p:cNvSpPr>
+          <p:nvPr>
+            <p:ph type="sldNum" sz="quarter" idx="5"/>
+          </p:nvPr>
+        </p:nvSpPr>
+        <p:spPr/>
+        <p:txBody>
+          <a:bodyPr/>
+          <a:lstStyle/>
+          <a:p>
+            <a:fld id="{ABE4E841-BA16-44AC-AB2C-E0471073EDA2}" type="slidenum">
+              <a:rPr lang="ru-RU" smtClean="0"/>
+              <a:t>1</a:t>
+            </a:fld>
+            <a:endParaRPr lang="ru-RU"/>
+          </a:p>
+        </p:txBody>
+      </p:sp>
+    </p:spTree>
+    <p:extLst>
+      <p:ext uri="{BB962C8B-B14F-4D97-AF65-F5344CB8AC3E}">
+        <p14:creationId xmlns:p14="http://schemas.microsoft.com/office/powerpoint/2010/main" val="20661067"/>
+      </p:ext>
+    </p:extLst>
+  </p:cSld>
+  <p:clrMapOvr>
+    <a:masterClrMapping/>
+  </p:clrMapOvr>
+</p:notes>
+</file>
+
 <file path=ppt/slideLayouts/slideLayout1.xml><?xml version="1.0" encoding="utf-8"?>
 <p:sldLayout xmlns:a="http://schemas.openxmlformats.org/drawingml/2006/main" xmlns:r="http://schemas.openxmlformats.org/officeDocument/2006/relationships" xmlns:p="http://schemas.openxmlformats.org/presentationml/2006/main" type="title" preserve="1">
   <p:cSld name="Title Slide">
@@ -261,7 +698,7 @@
           <a:p>
             <a:fld id="{0D7FD7F5-632F-44ED-AAD5-FBC5F0F040F7}" type="datetimeFigureOut">
               <a:rPr lang="ru-RU" smtClean="0"/>
-              <a:t>10.12.2024</a:t>
+              <a:t>11.12.2024</a:t>
             </a:fld>
             <a:endParaRPr lang="ru-RU"/>
           </a:p>
@@ -461,7 +898,7 @@
           <a:p>
             <a:fld id="{0D7FD7F5-632F-44ED-AAD5-FBC5F0F040F7}" type="datetimeFigureOut">
               <a:rPr lang="ru-RU" smtClean="0"/>
-              <a:t>10.12.2024</a:t>
+              <a:t>11.12.2024</a:t>
             </a:fld>
             <a:endParaRPr lang="ru-RU"/>
           </a:p>
@@ -671,7 +1108,7 @@
           <a:p>
             <a:fld id="{0D7FD7F5-632F-44ED-AAD5-FBC5F0F040F7}" type="datetimeFigureOut">
               <a:rPr lang="ru-RU" smtClean="0"/>
-              <a:t>10.12.2024</a:t>
+              <a:t>11.12.2024</a:t>
             </a:fld>
             <a:endParaRPr lang="ru-RU"/>
           </a:p>
@@ -871,7 +1308,7 @@
           <a:p>
             <a:fld id="{0D7FD7F5-632F-44ED-AAD5-FBC5F0F040F7}" type="datetimeFigureOut">
               <a:rPr lang="ru-RU" smtClean="0"/>
-              <a:t>10.12.2024</a:t>
+              <a:t>11.12.2024</a:t>
             </a:fld>
             <a:endParaRPr lang="ru-RU"/>
           </a:p>
@@ -1147,7 +1584,7 @@
           <a:p>
             <a:fld id="{0D7FD7F5-632F-44ED-AAD5-FBC5F0F040F7}" type="datetimeFigureOut">
               <a:rPr lang="ru-RU" smtClean="0"/>
-              <a:t>10.12.2024</a:t>
+              <a:t>11.12.2024</a:t>
             </a:fld>
             <a:endParaRPr lang="ru-RU"/>
           </a:p>
@@ -1415,7 +1852,7 @@
           <a:p>
             <a:fld id="{0D7FD7F5-632F-44ED-AAD5-FBC5F0F040F7}" type="datetimeFigureOut">
               <a:rPr lang="ru-RU" smtClean="0"/>
-              <a:t>10.12.2024</a:t>
+              <a:t>11.12.2024</a:t>
             </a:fld>
             <a:endParaRPr lang="ru-RU"/>
           </a:p>
@@ -1830,7 +2267,7 @@
           <a:p>
             <a:fld id="{0D7FD7F5-632F-44ED-AAD5-FBC5F0F040F7}" type="datetimeFigureOut">
               <a:rPr lang="ru-RU" smtClean="0"/>
-              <a:t>10.12.2024</a:t>
+              <a:t>11.12.2024</a:t>
             </a:fld>
             <a:endParaRPr lang="ru-RU"/>
           </a:p>
@@ -1972,7 +2409,7 @@
           <a:p>
             <a:fld id="{0D7FD7F5-632F-44ED-AAD5-FBC5F0F040F7}" type="datetimeFigureOut">
               <a:rPr lang="ru-RU" smtClean="0"/>
-              <a:t>10.12.2024</a:t>
+              <a:t>11.12.2024</a:t>
             </a:fld>
             <a:endParaRPr lang="ru-RU"/>
           </a:p>
@@ -2085,7 +2522,7 @@
           <a:p>
             <a:fld id="{0D7FD7F5-632F-44ED-AAD5-FBC5F0F040F7}" type="datetimeFigureOut">
               <a:rPr lang="ru-RU" smtClean="0"/>
-              <a:t>10.12.2024</a:t>
+              <a:t>11.12.2024</a:t>
             </a:fld>
             <a:endParaRPr lang="ru-RU"/>
           </a:p>
@@ -2398,7 +2835,7 @@
           <a:p>
             <a:fld id="{0D7FD7F5-632F-44ED-AAD5-FBC5F0F040F7}" type="datetimeFigureOut">
               <a:rPr lang="ru-RU" smtClean="0"/>
-              <a:t>10.12.2024</a:t>
+              <a:t>11.12.2024</a:t>
             </a:fld>
             <a:endParaRPr lang="ru-RU"/>
           </a:p>
@@ -2687,7 +3124,7 @@
           <a:p>
             <a:fld id="{0D7FD7F5-632F-44ED-AAD5-FBC5F0F040F7}" type="datetimeFigureOut">
               <a:rPr lang="ru-RU" smtClean="0"/>
-              <a:t>10.12.2024</a:t>
+              <a:t>11.12.2024</a:t>
             </a:fld>
             <a:endParaRPr lang="ru-RU"/>
           </a:p>
@@ -2930,7 +3367,7 @@
           <a:p>
             <a:fld id="{0D7FD7F5-632F-44ED-AAD5-FBC5F0F040F7}" type="datetimeFigureOut">
               <a:rPr lang="ru-RU" smtClean="0"/>
-              <a:t>10.12.2024</a:t>
+              <a:t>11.12.2024</a:t>
             </a:fld>
             <a:endParaRPr lang="ru-RU"/>
           </a:p>
@@ -3372,8 +3809,8 @@
         </p:nvSpPr>
         <p:spPr>
           <a:xfrm>
-            <a:off x="604008" y="2969704"/>
-            <a:ext cx="3074564" cy="1681990"/>
+            <a:off x="525231" y="1391862"/>
+            <a:ext cx="3074564" cy="2298697"/>
           </a:xfrm>
           <a:prstGeom prst="rect">
             <a:avLst/>
@@ -3431,7 +3868,7 @@
         </p:nvSpPr>
         <p:spPr>
           <a:xfrm>
-            <a:off x="1078569" y="512894"/>
+            <a:off x="5786137" y="3754467"/>
             <a:ext cx="1050021" cy="550333"/>
           </a:xfrm>
           <a:prstGeom prst="rect">
@@ -3705,7 +4142,7 @@
         </p:nvSpPr>
         <p:spPr>
           <a:xfrm>
-            <a:off x="5132956" y="5810350"/>
+            <a:off x="4325434" y="5808019"/>
             <a:ext cx="1437604" cy="550333"/>
           </a:xfrm>
           <a:prstGeom prst="rect">
@@ -3767,8 +4204,71 @@
         </p:nvSpPr>
         <p:spPr>
           <a:xfrm>
-            <a:off x="8664138" y="5808019"/>
+            <a:off x="8628000" y="5869895"/>
             <a:ext cx="1813712" cy="550333"/>
+          </a:xfrm>
+          <a:prstGeom prst="rect">
+            <a:avLst/>
+          </a:prstGeom>
+          <a:solidFill>
+            <a:schemeClr val="accent6">
+              <a:lumMod val="50000"/>
+            </a:schemeClr>
+          </a:solidFill>
+          <a:ln>
+            <a:solidFill>
+              <a:schemeClr val="accent6">
+                <a:lumMod val="75000"/>
+              </a:schemeClr>
+            </a:solidFill>
+            <a:prstDash val="dash"/>
+          </a:ln>
+        </p:spPr>
+        <p:style>
+          <a:lnRef idx="2">
+            <a:schemeClr val="accent1">
+              <a:shade val="15000"/>
+            </a:schemeClr>
+          </a:lnRef>
+          <a:fillRef idx="1">
+            <a:schemeClr val="accent1"/>
+          </a:fillRef>
+          <a:effectRef idx="0">
+            <a:schemeClr val="accent1"/>
+          </a:effectRef>
+          <a:fontRef idx="minor">
+            <a:schemeClr val="lt1"/>
+          </a:fontRef>
+        </p:style>
+        <p:txBody>
+          <a:bodyPr rtlCol="0" anchor="ctr"/>
+          <a:lstStyle/>
+          <a:p>
+            <a:pPr algn="ctr"/>
+            <a:r>
+              <a:rPr lang="en-US" dirty="0"/>
+              <a:t>ReadableStream</a:t>
+            </a:r>
+            <a:endParaRPr lang="ru-RU" dirty="0"/>
+          </a:p>
+        </p:txBody>
+      </p:sp>
+      <p:sp>
+        <p:nvSpPr>
+          <p:cNvPr id="10" name="Rectangle 9">
+            <a:extLst>
+              <a:ext uri="{FF2B5EF4-FFF2-40B4-BE49-F238E27FC236}">
+                <a16:creationId xmlns:a16="http://schemas.microsoft.com/office/drawing/2014/main" id="{88D4087C-630D-139F-C3E2-65C20E6A7415}"/>
+              </a:ext>
+            </a:extLst>
+          </p:cNvPr>
+          <p:cNvSpPr/>
+          <p:nvPr/>
+        </p:nvSpPr>
+        <p:spPr>
+          <a:xfrm>
+            <a:off x="4391149" y="1942748"/>
+            <a:ext cx="1459859" cy="487963"/>
           </a:xfrm>
           <a:prstGeom prst="rect">
             <a:avLst/>
@@ -3808,19 +4308,25 @@
           <a:p>
             <a:pPr algn="ctr"/>
             <a:r>
-              <a:rPr lang="en-US" dirty="0"/>
-              <a:t>ReadableStream</a:t>
-            </a:r>
-            <a:endParaRPr lang="ru-RU" dirty="0"/>
-          </a:p>
-        </p:txBody>
-      </p:sp>
-      <p:sp>
-        <p:nvSpPr>
-          <p:cNvPr id="10" name="Rectangle 9">
-            <a:extLst>
-              <a:ext uri="{FF2B5EF4-FFF2-40B4-BE49-F238E27FC236}">
-                <a16:creationId xmlns:a16="http://schemas.microsoft.com/office/drawing/2014/main" id="{88D4087C-630D-139F-C3E2-65C20E6A7415}"/>
+              <a:rPr lang="en-US" sz="1600" b="0" i="0" dirty="0" err="1">
+                <a:solidFill>
+                  <a:srgbClr val="FFFFFF"/>
+                </a:solidFill>
+                <a:effectLst/>
+                <a:latin typeface="Helvetica" panose="020B0604020202020204" pitchFamily="34" charset="0"/>
+              </a:rPr>
+              <a:t>serveStatic</a:t>
+            </a:r>
+            <a:endParaRPr lang="ru-RU" sz="1600" dirty="0"/>
+          </a:p>
+        </p:txBody>
+      </p:sp>
+      <p:sp>
+        <p:nvSpPr>
+          <p:cNvPr id="2" name="Rectangle 1">
+            <a:extLst>
+              <a:ext uri="{FF2B5EF4-FFF2-40B4-BE49-F238E27FC236}">
+                <a16:creationId xmlns:a16="http://schemas.microsoft.com/office/drawing/2014/main" id="{908EE429-205E-7322-4A74-897056471B86}"/>
               </a:ext>
             </a:extLst>
           </p:cNvPr>
@@ -3829,7 +4335,154 @@
         </p:nvSpPr>
         <p:spPr>
           <a:xfrm>
-            <a:off x="4737568" y="3604584"/>
+            <a:off x="9937230" y="2866644"/>
+            <a:ext cx="1351706" cy="451812"/>
+          </a:xfrm>
+          <a:prstGeom prst="rect">
+            <a:avLst/>
+          </a:prstGeom>
+          <a:solidFill>
+            <a:schemeClr val="accent6">
+              <a:lumMod val="50000"/>
+            </a:schemeClr>
+          </a:solidFill>
+          <a:ln>
+            <a:solidFill>
+              <a:schemeClr val="accent6">
+                <a:lumMod val="75000"/>
+              </a:schemeClr>
+            </a:solidFill>
+            <a:prstDash val="dash"/>
+          </a:ln>
+        </p:spPr>
+        <p:style>
+          <a:lnRef idx="2">
+            <a:schemeClr val="accent1">
+              <a:shade val="15000"/>
+            </a:schemeClr>
+          </a:lnRef>
+          <a:fillRef idx="1">
+            <a:schemeClr val="accent1"/>
+          </a:fillRef>
+          <a:effectRef idx="0">
+            <a:schemeClr val="accent1"/>
+          </a:effectRef>
+          <a:fontRef idx="minor">
+            <a:schemeClr val="lt1"/>
+          </a:fontRef>
+        </p:style>
+        <p:txBody>
+          <a:bodyPr rtlCol="0" anchor="ctr"/>
+          <a:lstStyle/>
+          <a:p>
+            <a:pPr algn="ctr"/>
+            <a:r>
+              <a:rPr lang="en-US" sz="1400" b="0" i="0" dirty="0" err="1">
+                <a:solidFill>
+                  <a:srgbClr val="FFFFFF"/>
+                </a:solidFill>
+                <a:effectLst/>
+                <a:latin typeface="Helvetica" panose="020B0604020202020204" pitchFamily="34" charset="0"/>
+              </a:rPr>
+              <a:t>PreparedFile</a:t>
+            </a:r>
+            <a:endParaRPr lang="ru-RU" sz="1400" dirty="0"/>
+          </a:p>
+        </p:txBody>
+      </p:sp>
+      <p:sp>
+        <p:nvSpPr>
+          <p:cNvPr id="11" name="Rectangle 10">
+            <a:extLst>
+              <a:ext uri="{FF2B5EF4-FFF2-40B4-BE49-F238E27FC236}">
+                <a16:creationId xmlns:a16="http://schemas.microsoft.com/office/drawing/2014/main" id="{6D1F8BC0-EDE4-C6D9-20A2-AE4CEA3ADEFD}"/>
+              </a:ext>
+            </a:extLst>
+          </p:cNvPr>
+          <p:cNvSpPr/>
+          <p:nvPr/>
+        </p:nvSpPr>
+        <p:spPr>
+          <a:xfrm>
+            <a:off x="8314238" y="2866644"/>
+            <a:ext cx="1351707" cy="451813"/>
+          </a:xfrm>
+          <a:prstGeom prst="rect">
+            <a:avLst/>
+          </a:prstGeom>
+          <a:solidFill>
+            <a:schemeClr val="accent6">
+              <a:lumMod val="50000"/>
+            </a:schemeClr>
+          </a:solidFill>
+          <a:ln>
+            <a:solidFill>
+              <a:schemeClr val="accent6">
+                <a:lumMod val="75000"/>
+              </a:schemeClr>
+            </a:solidFill>
+            <a:prstDash val="dash"/>
+          </a:ln>
+        </p:spPr>
+        <p:style>
+          <a:lnRef idx="2">
+            <a:schemeClr val="accent1">
+              <a:shade val="15000"/>
+            </a:schemeClr>
+          </a:lnRef>
+          <a:fillRef idx="1">
+            <a:schemeClr val="accent1"/>
+          </a:fillRef>
+          <a:effectRef idx="0">
+            <a:schemeClr val="accent1"/>
+          </a:effectRef>
+          <a:fontRef idx="minor">
+            <a:schemeClr val="lt1"/>
+          </a:fontRef>
+        </p:style>
+        <p:txBody>
+          <a:bodyPr rtlCol="0" anchor="ctr"/>
+          <a:lstStyle/>
+          <a:p>
+            <a:pPr algn="ctr"/>
+            <a:r>
+              <a:rPr lang="en-US" sz="1400" dirty="0" err="1">
+                <a:solidFill>
+                  <a:srgbClr val="FFFFFF"/>
+                </a:solidFill>
+                <a:latin typeface="Helvetica" panose="020B0604020202020204" pitchFamily="34" charset="0"/>
+              </a:rPr>
+              <a:t>App</a:t>
+            </a:r>
+            <a:r>
+              <a:rPr lang="en-US" sz="1400" b="0" i="0" dirty="0" err="1">
+                <a:solidFill>
+                  <a:srgbClr val="FFFFFF"/>
+                </a:solidFill>
+                <a:effectLst/>
+                <a:latin typeface="Helvetica" panose="020B0604020202020204" pitchFamily="34" charset="0"/>
+              </a:rPr>
+              <a:t>Storage</a:t>
+            </a:r>
+            <a:endParaRPr lang="ru-RU" sz="1400" dirty="0"/>
+          </a:p>
+        </p:txBody>
+      </p:sp>
+      <p:sp>
+        <p:nvSpPr>
+          <p:cNvPr id="12" name="Rectangle 11">
+            <a:extLst>
+              <a:ext uri="{FF2B5EF4-FFF2-40B4-BE49-F238E27FC236}">
+                <a16:creationId xmlns:a16="http://schemas.microsoft.com/office/drawing/2014/main" id="{D2A954F7-5BFC-9B18-32BD-2189C457B3CE}"/>
+              </a:ext>
+            </a:extLst>
+          </p:cNvPr>
+          <p:cNvSpPr/>
+          <p:nvPr/>
+        </p:nvSpPr>
+        <p:spPr>
+          <a:xfrm>
+            <a:off x="755689" y="1787094"/>
             <a:ext cx="1646455" cy="550333"/>
           </a:xfrm>
           <a:prstGeom prst="rect">
@@ -3877,7 +4530,7 @@
                 <a:effectLst/>
                 <a:latin typeface="Helvetica" panose="020B0604020202020204" pitchFamily="34" charset="0"/>
               </a:rPr>
-              <a:t>serveStatic</a:t>
+              <a:t>createLogger</a:t>
             </a:r>
             <a:endParaRPr lang="ru-RU" sz="1600" dirty="0"/>
           </a:p>
@@ -3885,10 +4538,10 @@
       </p:sp>
       <p:sp>
         <p:nvSpPr>
-          <p:cNvPr id="2" name="Rectangle 1">
-            <a:extLst>
-              <a:ext uri="{FF2B5EF4-FFF2-40B4-BE49-F238E27FC236}">
-                <a16:creationId xmlns:a16="http://schemas.microsoft.com/office/drawing/2014/main" id="{908EE429-205E-7322-4A74-897056471B86}"/>
+          <p:cNvPr id="14" name="Rectangle 13">
+            <a:extLst>
+              <a:ext uri="{FF2B5EF4-FFF2-40B4-BE49-F238E27FC236}">
+                <a16:creationId xmlns:a16="http://schemas.microsoft.com/office/drawing/2014/main" id="{021BAD32-0853-FBCB-818A-BBA646069936}"/>
               </a:ext>
             </a:extLst>
           </p:cNvPr>
@@ -3897,8 +4550,237 @@
         </p:nvSpPr>
         <p:spPr>
           <a:xfrm>
-            <a:off x="8040033" y="3288250"/>
-            <a:ext cx="1646455" cy="550333"/>
+            <a:off x="4188214" y="661065"/>
+            <a:ext cx="3074564" cy="1953790"/>
+          </a:xfrm>
+          <a:prstGeom prst="rect">
+            <a:avLst/>
+          </a:prstGeom>
+          <a:noFill/>
+          <a:ln w="19050">
+            <a:solidFill>
+              <a:schemeClr val="accent6">
+                <a:lumMod val="50000"/>
+              </a:schemeClr>
+            </a:solidFill>
+            <a:prstDash val="sysDash"/>
+          </a:ln>
+        </p:spPr>
+        <p:style>
+          <a:lnRef idx="2">
+            <a:schemeClr val="accent1">
+              <a:shade val="15000"/>
+            </a:schemeClr>
+          </a:lnRef>
+          <a:fillRef idx="1">
+            <a:schemeClr val="accent1"/>
+          </a:fillRef>
+          <a:effectRef idx="0">
+            <a:schemeClr val="accent1"/>
+          </a:effectRef>
+          <a:fontRef idx="minor">
+            <a:schemeClr val="lt1"/>
+          </a:fontRef>
+        </p:style>
+        <p:txBody>
+          <a:bodyPr rtlCol="0" anchor="t"/>
+          <a:lstStyle/>
+          <a:p>
+            <a:pPr algn="r"/>
+            <a:r>
+              <a:rPr lang="en-US" dirty="0" err="1"/>
+              <a:t>server.ts</a:t>
+            </a:r>
+            <a:endParaRPr lang="ru-RU" dirty="0"/>
+          </a:p>
+        </p:txBody>
+      </p:sp>
+      <p:sp>
+        <p:nvSpPr>
+          <p:cNvPr id="15" name="Rectangle 14">
+            <a:extLst>
+              <a:ext uri="{FF2B5EF4-FFF2-40B4-BE49-F238E27FC236}">
+                <a16:creationId xmlns:a16="http://schemas.microsoft.com/office/drawing/2014/main" id="{9B4AFE78-B529-8893-7E4D-55CC38CDA094}"/>
+              </a:ext>
+            </a:extLst>
+          </p:cNvPr>
+          <p:cNvSpPr/>
+          <p:nvPr/>
+        </p:nvSpPr>
+        <p:spPr>
+          <a:xfrm>
+            <a:off x="8141587" y="1335283"/>
+            <a:ext cx="3348604" cy="2298697"/>
+          </a:xfrm>
+          <a:prstGeom prst="rect">
+            <a:avLst/>
+          </a:prstGeom>
+          <a:noFill/>
+          <a:ln w="19050">
+            <a:solidFill>
+              <a:schemeClr val="accent6">
+                <a:lumMod val="50000"/>
+              </a:schemeClr>
+            </a:solidFill>
+            <a:prstDash val="sysDash"/>
+          </a:ln>
+        </p:spPr>
+        <p:style>
+          <a:lnRef idx="2">
+            <a:schemeClr val="accent1">
+              <a:shade val="15000"/>
+            </a:schemeClr>
+          </a:lnRef>
+          <a:fillRef idx="1">
+            <a:schemeClr val="accent1"/>
+          </a:fillRef>
+          <a:effectRef idx="0">
+            <a:schemeClr val="accent1"/>
+          </a:effectRef>
+          <a:fontRef idx="minor">
+            <a:schemeClr val="lt1"/>
+          </a:fontRef>
+        </p:style>
+        <p:txBody>
+          <a:bodyPr rtlCol="0" anchor="t"/>
+          <a:lstStyle/>
+          <a:p>
+            <a:pPr algn="r"/>
+            <a:r>
+              <a:rPr lang="en-US" dirty="0" err="1"/>
+              <a:t>storage.ts</a:t>
+            </a:r>
+            <a:endParaRPr lang="ru-RU" dirty="0"/>
+          </a:p>
+        </p:txBody>
+      </p:sp>
+      <p:sp>
+        <p:nvSpPr>
+          <p:cNvPr id="16" name="Rectangle 15">
+            <a:extLst>
+              <a:ext uri="{FF2B5EF4-FFF2-40B4-BE49-F238E27FC236}">
+                <a16:creationId xmlns:a16="http://schemas.microsoft.com/office/drawing/2014/main" id="{05C29E96-55E3-8EDD-F399-F50F4D116488}"/>
+              </a:ext>
+            </a:extLst>
+          </p:cNvPr>
+          <p:cNvSpPr/>
+          <p:nvPr/>
+        </p:nvSpPr>
+        <p:spPr>
+          <a:xfrm>
+            <a:off x="4391149" y="969562"/>
+            <a:ext cx="1459859" cy="487963"/>
+          </a:xfrm>
+          <a:prstGeom prst="rect">
+            <a:avLst/>
+          </a:prstGeom>
+          <a:solidFill>
+            <a:schemeClr val="accent6">
+              <a:lumMod val="50000"/>
+            </a:schemeClr>
+          </a:solidFill>
+          <a:ln>
+            <a:solidFill>
+              <a:schemeClr val="accent6">
+                <a:lumMod val="75000"/>
+              </a:schemeClr>
+            </a:solidFill>
+            <a:prstDash val="dash"/>
+          </a:ln>
+        </p:spPr>
+        <p:style>
+          <a:lnRef idx="2">
+            <a:schemeClr val="accent1">
+              <a:shade val="15000"/>
+            </a:schemeClr>
+          </a:lnRef>
+          <a:fillRef idx="1">
+            <a:schemeClr val="accent1"/>
+          </a:fillRef>
+          <a:effectRef idx="0">
+            <a:schemeClr val="accent1"/>
+          </a:effectRef>
+          <a:fontRef idx="minor">
+            <a:schemeClr val="lt1"/>
+          </a:fontRef>
+        </p:style>
+        <p:txBody>
+          <a:bodyPr rtlCol="0" anchor="ctr"/>
+          <a:lstStyle/>
+          <a:p>
+            <a:pPr algn="ctr"/>
+            <a:r>
+              <a:rPr lang="en-US" sz="1600" b="0" i="0" dirty="0" err="1">
+                <a:solidFill>
+                  <a:srgbClr val="FFFFFF"/>
+                </a:solidFill>
+                <a:effectLst/>
+                <a:latin typeface="Helvetica" panose="020B0604020202020204" pitchFamily="34" charset="0"/>
+              </a:rPr>
+              <a:t>ServeStaticFn</a:t>
+            </a:r>
+            <a:endParaRPr lang="ru-RU" sz="1600" dirty="0"/>
+          </a:p>
+        </p:txBody>
+      </p:sp>
+      <p:cxnSp>
+        <p:nvCxnSpPr>
+          <p:cNvPr id="23" name="Straight Arrow Connector 22">
+            <a:extLst>
+              <a:ext uri="{FF2B5EF4-FFF2-40B4-BE49-F238E27FC236}">
+                <a16:creationId xmlns:a16="http://schemas.microsoft.com/office/drawing/2014/main" id="{9968EB5B-00E8-E222-0401-F23B7FD20088}"/>
+              </a:ext>
+            </a:extLst>
+          </p:cNvPr>
+          <p:cNvCxnSpPr>
+            <a:stCxn id="10" idx="0"/>
+            <a:endCxn id="16" idx="2"/>
+          </p:cNvCxnSpPr>
+          <p:nvPr/>
+        </p:nvCxnSpPr>
+        <p:spPr>
+          <a:xfrm flipV="1">
+            <a:off x="5121079" y="1457525"/>
+            <a:ext cx="0" cy="485223"/>
+          </a:xfrm>
+          <a:prstGeom prst="straightConnector1">
+            <a:avLst/>
+          </a:prstGeom>
+          <a:ln>
+            <a:tailEnd type="triangle"/>
+          </a:ln>
+        </p:spPr>
+        <p:style>
+          <a:lnRef idx="1">
+            <a:schemeClr val="accent1"/>
+          </a:lnRef>
+          <a:fillRef idx="0">
+            <a:schemeClr val="accent1"/>
+          </a:fillRef>
+          <a:effectRef idx="0">
+            <a:schemeClr val="accent1"/>
+          </a:effectRef>
+          <a:fontRef idx="minor">
+            <a:schemeClr val="tx1"/>
+          </a:fontRef>
+        </p:style>
+      </p:cxnSp>
+      <p:sp>
+        <p:nvSpPr>
+          <p:cNvPr id="24" name="Rectangle 23">
+            <a:extLst>
+              <a:ext uri="{FF2B5EF4-FFF2-40B4-BE49-F238E27FC236}">
+                <a16:creationId xmlns:a16="http://schemas.microsoft.com/office/drawing/2014/main" id="{C306F2E9-7C9E-E8ED-9C86-8EF41EDE319C}"/>
+              </a:ext>
+            </a:extLst>
+          </p:cNvPr>
+          <p:cNvSpPr/>
+          <p:nvPr/>
+        </p:nvSpPr>
+        <p:spPr>
+          <a:xfrm>
+            <a:off x="8594414" y="1610449"/>
+            <a:ext cx="1582709" cy="451812"/>
           </a:xfrm>
           <a:prstGeom prst="rect">
             <a:avLst/>
@@ -3938,25 +4820,34 @@
           <a:p>
             <a:pPr algn="ctr"/>
             <a:r>
-              <a:rPr lang="en-US" sz="1600" b="0" i="0" dirty="0" err="1">
+              <a:rPr lang="en-US" sz="1400" dirty="0" err="1">
+                <a:solidFill>
+                  <a:srgbClr val="FFFFFF"/>
+                </a:solidFill>
+                <a:latin typeface="Helvetica" panose="020B0604020202020204" pitchFamily="34" charset="0"/>
+              </a:rPr>
+              <a:t>App</a:t>
+            </a:r>
+            <a:r>
+              <a:rPr lang="en-US" sz="1400" b="0" i="0" dirty="0" err="1">
                 <a:solidFill>
                   <a:srgbClr val="FFFFFF"/>
                 </a:solidFill>
                 <a:effectLst/>
                 <a:latin typeface="Helvetica" panose="020B0604020202020204" pitchFamily="34" charset="0"/>
               </a:rPr>
-              <a:t>PreparedFile</a:t>
-            </a:r>
-            <a:endParaRPr lang="ru-RU" sz="1600" dirty="0"/>
-          </a:p>
-        </p:txBody>
-      </p:sp>
-      <p:sp>
-        <p:nvSpPr>
-          <p:cNvPr id="11" name="Rectangle 10">
-            <a:extLst>
-              <a:ext uri="{FF2B5EF4-FFF2-40B4-BE49-F238E27FC236}">
-                <a16:creationId xmlns:a16="http://schemas.microsoft.com/office/drawing/2014/main" id="{6D1F8BC0-EDE4-C6D9-20A2-AE4CEA3ADEFD}"/>
+              <a:t>StorageImpl</a:t>
+            </a:r>
+            <a:endParaRPr lang="ru-RU" sz="1400" dirty="0"/>
+          </a:p>
+        </p:txBody>
+      </p:sp>
+      <p:sp>
+        <p:nvSpPr>
+          <p:cNvPr id="31" name="Rectangle 30">
+            <a:extLst>
+              <a:ext uri="{FF2B5EF4-FFF2-40B4-BE49-F238E27FC236}">
+                <a16:creationId xmlns:a16="http://schemas.microsoft.com/office/drawing/2014/main" id="{E4D0E244-E028-53FE-62D0-C456DD1C566B}"/>
               </a:ext>
             </a:extLst>
           </p:cNvPr>
@@ -3965,7 +4856,7 @@
         </p:nvSpPr>
         <p:spPr>
           <a:xfrm>
-            <a:off x="8040032" y="4064969"/>
+            <a:off x="758125" y="2927815"/>
             <a:ext cx="1646455" cy="550333"/>
           </a:xfrm>
           <a:prstGeom prst="rect">
@@ -3982,6 +4873,7 @@
                 <a:lumMod val="75000"/>
               </a:schemeClr>
             </a:solidFill>
+            <a:prstDash val="dash"/>
           </a:ln>
         </p:spPr>
         <p:style>
@@ -4006,74 +4898,6 @@
           <a:p>
             <a:pPr algn="ctr"/>
             <a:r>
-              <a:rPr lang="en-US" sz="1600" b="0" i="0" dirty="0">
-                <a:solidFill>
-                  <a:srgbClr val="FFFFFF"/>
-                </a:solidFill>
-                <a:effectLst/>
-                <a:latin typeface="Helvetica" panose="020B0604020202020204" pitchFamily="34" charset="0"/>
-              </a:rPr>
-              <a:t>Storage</a:t>
-            </a:r>
-            <a:endParaRPr lang="ru-RU" sz="1600" dirty="0"/>
-          </a:p>
-        </p:txBody>
-      </p:sp>
-      <p:sp>
-        <p:nvSpPr>
-          <p:cNvPr id="12" name="Rectangle 11">
-            <a:extLst>
-              <a:ext uri="{FF2B5EF4-FFF2-40B4-BE49-F238E27FC236}">
-                <a16:creationId xmlns:a16="http://schemas.microsoft.com/office/drawing/2014/main" id="{D2A954F7-5BFC-9B18-32BD-2189C457B3CE}"/>
-              </a:ext>
-            </a:extLst>
-          </p:cNvPr>
-          <p:cNvSpPr/>
-          <p:nvPr/>
-        </p:nvSpPr>
-        <p:spPr>
-          <a:xfrm>
-            <a:off x="888419" y="3909933"/>
-            <a:ext cx="1646455" cy="550333"/>
-          </a:xfrm>
-          <a:prstGeom prst="rect">
-            <a:avLst/>
-          </a:prstGeom>
-          <a:solidFill>
-            <a:schemeClr val="accent6">
-              <a:lumMod val="50000"/>
-            </a:schemeClr>
-          </a:solidFill>
-          <a:ln>
-            <a:solidFill>
-              <a:schemeClr val="accent6">
-                <a:lumMod val="75000"/>
-              </a:schemeClr>
-            </a:solidFill>
-          </a:ln>
-        </p:spPr>
-        <p:style>
-          <a:lnRef idx="2">
-            <a:schemeClr val="accent1">
-              <a:shade val="15000"/>
-            </a:schemeClr>
-          </a:lnRef>
-          <a:fillRef idx="1">
-            <a:schemeClr val="accent1"/>
-          </a:fillRef>
-          <a:effectRef idx="0">
-            <a:schemeClr val="accent1"/>
-          </a:effectRef>
-          <a:fontRef idx="minor">
-            <a:schemeClr val="lt1"/>
-          </a:fontRef>
-        </p:style>
-        <p:txBody>
-          <a:bodyPr rtlCol="0" anchor="ctr"/>
-          <a:lstStyle/>
-          <a:p>
-            <a:pPr algn="ctr"/>
-            <a:r>
               <a:rPr lang="en-US" sz="1600" b="0" i="0" dirty="0" err="1">
                 <a:solidFill>
                   <a:srgbClr val="FFFFFF"/>
@@ -4081,130 +4905,473 @@
                 <a:effectLst/>
                 <a:latin typeface="Helvetica" panose="020B0604020202020204" pitchFamily="34" charset="0"/>
               </a:rPr>
-              <a:t>createLogger</a:t>
+              <a:t>LoggerCreator</a:t>
             </a:r>
             <a:endParaRPr lang="ru-RU" sz="1600" dirty="0"/>
           </a:p>
         </p:txBody>
       </p:sp>
-      <p:sp>
-        <p:nvSpPr>
-          <p:cNvPr id="14" name="Rectangle 13">
-            <a:extLst>
-              <a:ext uri="{FF2B5EF4-FFF2-40B4-BE49-F238E27FC236}">
-                <a16:creationId xmlns:a16="http://schemas.microsoft.com/office/drawing/2014/main" id="{021BAD32-0853-FBCB-818A-BBA646069936}"/>
-              </a:ext>
-            </a:extLst>
-          </p:cNvPr>
-          <p:cNvSpPr/>
+      <p:cxnSp>
+        <p:nvCxnSpPr>
+          <p:cNvPr id="33" name="Straight Arrow Connector 32">
+            <a:extLst>
+              <a:ext uri="{FF2B5EF4-FFF2-40B4-BE49-F238E27FC236}">
+                <a16:creationId xmlns:a16="http://schemas.microsoft.com/office/drawing/2014/main" id="{E12042ED-2A1C-6891-194F-F8CDDCB8D14D}"/>
+              </a:ext>
+            </a:extLst>
+          </p:cNvPr>
+          <p:cNvCxnSpPr>
+            <a:stCxn id="3" idx="0"/>
+            <a:endCxn id="10" idx="2"/>
+          </p:cNvCxnSpPr>
           <p:nvPr/>
-        </p:nvSpPr>
+        </p:nvCxnSpPr>
         <p:spPr>
-          <a:xfrm>
-            <a:off x="4200089" y="3038756"/>
-            <a:ext cx="3074564" cy="1681990"/>
+          <a:xfrm flipV="1">
+            <a:off x="5044236" y="2430711"/>
+            <a:ext cx="76843" cy="3377308"/>
           </a:xfrm>
-          <a:prstGeom prst="rect">
+          <a:prstGeom prst="straightConnector1">
             <a:avLst/>
           </a:prstGeom>
-          <a:noFill/>
-          <a:ln w="19050">
-            <a:solidFill>
-              <a:schemeClr val="accent6">
-                <a:lumMod val="50000"/>
-              </a:schemeClr>
-            </a:solidFill>
-            <a:prstDash val="sysDash"/>
+          <a:ln>
+            <a:tailEnd type="triangle"/>
           </a:ln>
         </p:spPr>
         <p:style>
-          <a:lnRef idx="2">
-            <a:schemeClr val="accent1">
-              <a:shade val="15000"/>
-            </a:schemeClr>
+          <a:lnRef idx="1">
+            <a:schemeClr val="accent1"/>
           </a:lnRef>
-          <a:fillRef idx="1">
+          <a:fillRef idx="0">
             <a:schemeClr val="accent1"/>
           </a:fillRef>
           <a:effectRef idx="0">
             <a:schemeClr val="accent1"/>
           </a:effectRef>
           <a:fontRef idx="minor">
-            <a:schemeClr val="lt1"/>
+            <a:schemeClr val="tx1"/>
           </a:fontRef>
         </p:style>
-        <p:txBody>
-          <a:bodyPr rtlCol="0" anchor="t"/>
-          <a:lstStyle/>
-          <a:p>
-            <a:pPr algn="r"/>
-            <a:r>
-              <a:rPr lang="en-US" dirty="0" err="1"/>
-              <a:t>server.ts</a:t>
-            </a:r>
-            <a:endParaRPr lang="ru-RU" dirty="0"/>
-          </a:p>
-        </p:txBody>
-      </p:sp>
-      <p:sp>
-        <p:nvSpPr>
-          <p:cNvPr id="15" name="Rectangle 14">
-            <a:extLst>
-              <a:ext uri="{FF2B5EF4-FFF2-40B4-BE49-F238E27FC236}">
-                <a16:creationId xmlns:a16="http://schemas.microsoft.com/office/drawing/2014/main" id="{9B4AFE78-B529-8893-7E4D-55CC38CDA094}"/>
-              </a:ext>
-            </a:extLst>
-          </p:cNvPr>
-          <p:cNvSpPr/>
+      </p:cxnSp>
+      <p:cxnSp>
+        <p:nvCxnSpPr>
+          <p:cNvPr id="44" name="Straight Arrow Connector 43">
+            <a:extLst>
+              <a:ext uri="{FF2B5EF4-FFF2-40B4-BE49-F238E27FC236}">
+                <a16:creationId xmlns:a16="http://schemas.microsoft.com/office/drawing/2014/main" id="{EB683CFA-265C-38C0-F8FD-0A35085C8230}"/>
+              </a:ext>
+            </a:extLst>
+          </p:cNvPr>
+          <p:cNvCxnSpPr>
+            <a:stCxn id="2" idx="2"/>
+            <a:endCxn id="5" idx="0"/>
+          </p:cNvCxnSpPr>
           <p:nvPr/>
-        </p:nvSpPr>
+        </p:nvCxnSpPr>
         <p:spPr>
-          <a:xfrm>
-            <a:off x="7762614" y="3068938"/>
-            <a:ext cx="3348604" cy="1681990"/>
+          <a:xfrm flipH="1">
+            <a:off x="9534856" y="3318456"/>
+            <a:ext cx="1078227" cy="2551439"/>
           </a:xfrm>
-          <a:prstGeom prst="rect">
+          <a:prstGeom prst="straightConnector1">
             <a:avLst/>
           </a:prstGeom>
-          <a:noFill/>
-          <a:ln w="19050">
-            <a:solidFill>
-              <a:schemeClr val="accent6">
-                <a:lumMod val="50000"/>
-              </a:schemeClr>
-            </a:solidFill>
-            <a:prstDash val="sysDash"/>
+          <a:ln>
+            <a:tailEnd type="triangle"/>
           </a:ln>
         </p:spPr>
         <p:style>
-          <a:lnRef idx="2">
-            <a:schemeClr val="accent1">
-              <a:shade val="15000"/>
-            </a:schemeClr>
+          <a:lnRef idx="1">
+            <a:schemeClr val="accent1"/>
           </a:lnRef>
-          <a:fillRef idx="1">
+          <a:fillRef idx="0">
             <a:schemeClr val="accent1"/>
           </a:fillRef>
           <a:effectRef idx="0">
             <a:schemeClr val="accent1"/>
           </a:effectRef>
           <a:fontRef idx="minor">
-            <a:schemeClr val="lt1"/>
+            <a:schemeClr val="tx1"/>
           </a:fontRef>
         </p:style>
-        <p:txBody>
-          <a:bodyPr rtlCol="0" anchor="t"/>
-          <a:lstStyle/>
-          <a:p>
-            <a:pPr algn="r"/>
-            <a:r>
-              <a:rPr lang="en-US" dirty="0" err="1"/>
-              <a:t>storage.ts</a:t>
-            </a:r>
-            <a:endParaRPr lang="ru-RU" dirty="0"/>
-          </a:p>
-        </p:txBody>
-      </p:sp>
+      </p:cxnSp>
+      <p:cxnSp>
+        <p:nvCxnSpPr>
+          <p:cNvPr id="50" name="Straight Arrow Connector 49">
+            <a:extLst>
+              <a:ext uri="{FF2B5EF4-FFF2-40B4-BE49-F238E27FC236}">
+                <a16:creationId xmlns:a16="http://schemas.microsoft.com/office/drawing/2014/main" id="{315F84C4-8EA6-B854-FFEF-110B739B33BF}"/>
+              </a:ext>
+            </a:extLst>
+          </p:cNvPr>
+          <p:cNvCxnSpPr>
+            <a:stCxn id="24" idx="2"/>
+            <a:endCxn id="2" idx="0"/>
+          </p:cNvCxnSpPr>
+          <p:nvPr/>
+        </p:nvCxnSpPr>
+        <p:spPr>
+          <a:xfrm>
+            <a:off x="9385769" y="2062261"/>
+            <a:ext cx="1227314" cy="804383"/>
+          </a:xfrm>
+          <a:prstGeom prst="straightConnector1">
+            <a:avLst/>
+          </a:prstGeom>
+          <a:ln>
+            <a:tailEnd type="triangle"/>
+          </a:ln>
+        </p:spPr>
+        <p:style>
+          <a:lnRef idx="1">
+            <a:schemeClr val="accent1"/>
+          </a:lnRef>
+          <a:fillRef idx="0">
+            <a:schemeClr val="accent1"/>
+          </a:fillRef>
+          <a:effectRef idx="0">
+            <a:schemeClr val="accent1"/>
+          </a:effectRef>
+          <a:fontRef idx="minor">
+            <a:schemeClr val="tx1"/>
+          </a:fontRef>
+        </p:style>
+      </p:cxnSp>
+      <p:cxnSp>
+        <p:nvCxnSpPr>
+          <p:cNvPr id="52" name="Straight Arrow Connector 51">
+            <a:extLst>
+              <a:ext uri="{FF2B5EF4-FFF2-40B4-BE49-F238E27FC236}">
+                <a16:creationId xmlns:a16="http://schemas.microsoft.com/office/drawing/2014/main" id="{47549A59-E504-BE1F-0382-7E0102291DB1}"/>
+              </a:ext>
+            </a:extLst>
+          </p:cNvPr>
+          <p:cNvCxnSpPr>
+            <a:stCxn id="24" idx="2"/>
+            <a:endCxn id="11" idx="0"/>
+          </p:cNvCxnSpPr>
+          <p:nvPr/>
+        </p:nvCxnSpPr>
+        <p:spPr>
+          <a:xfrm flipH="1">
+            <a:off x="8990092" y="2062261"/>
+            <a:ext cx="395677" cy="804383"/>
+          </a:xfrm>
+          <a:prstGeom prst="straightConnector1">
+            <a:avLst/>
+          </a:prstGeom>
+          <a:ln>
+            <a:tailEnd type="triangle"/>
+          </a:ln>
+        </p:spPr>
+        <p:style>
+          <a:lnRef idx="1">
+            <a:schemeClr val="accent1"/>
+          </a:lnRef>
+          <a:fillRef idx="0">
+            <a:schemeClr val="accent1"/>
+          </a:fillRef>
+          <a:effectRef idx="0">
+            <a:schemeClr val="accent1"/>
+          </a:effectRef>
+          <a:fontRef idx="minor">
+            <a:schemeClr val="tx1"/>
+          </a:fontRef>
+        </p:style>
+      </p:cxnSp>
+      <p:cxnSp>
+        <p:nvCxnSpPr>
+          <p:cNvPr id="59" name="Straight Arrow Connector 58">
+            <a:extLst>
+              <a:ext uri="{FF2B5EF4-FFF2-40B4-BE49-F238E27FC236}">
+                <a16:creationId xmlns:a16="http://schemas.microsoft.com/office/drawing/2014/main" id="{03926237-775A-D985-D5B3-523B3847C8AA}"/>
+              </a:ext>
+            </a:extLst>
+          </p:cNvPr>
+          <p:cNvCxnSpPr>
+            <a:stCxn id="31" idx="2"/>
+            <a:endCxn id="17" idx="0"/>
+          </p:cNvCxnSpPr>
+          <p:nvPr/>
+        </p:nvCxnSpPr>
+        <p:spPr>
+          <a:xfrm flipH="1">
+            <a:off x="1498718" y="3478148"/>
+            <a:ext cx="82635" cy="2329871"/>
+          </a:xfrm>
+          <a:prstGeom prst="straightConnector1">
+            <a:avLst/>
+          </a:prstGeom>
+          <a:ln>
+            <a:tailEnd type="triangle"/>
+          </a:ln>
+        </p:spPr>
+        <p:style>
+          <a:lnRef idx="1">
+            <a:schemeClr val="accent1"/>
+          </a:lnRef>
+          <a:fillRef idx="0">
+            <a:schemeClr val="accent1"/>
+          </a:fillRef>
+          <a:effectRef idx="0">
+            <a:schemeClr val="accent1"/>
+          </a:effectRef>
+          <a:fontRef idx="minor">
+            <a:schemeClr val="tx1"/>
+          </a:fontRef>
+        </p:style>
+      </p:cxnSp>
+      <p:cxnSp>
+        <p:nvCxnSpPr>
+          <p:cNvPr id="61" name="Straight Arrow Connector 60">
+            <a:extLst>
+              <a:ext uri="{FF2B5EF4-FFF2-40B4-BE49-F238E27FC236}">
+                <a16:creationId xmlns:a16="http://schemas.microsoft.com/office/drawing/2014/main" id="{08D4F1C1-6465-71AB-637D-00D38F1AB962}"/>
+              </a:ext>
+            </a:extLst>
+          </p:cNvPr>
+          <p:cNvCxnSpPr>
+            <a:stCxn id="12" idx="2"/>
+            <a:endCxn id="31" idx="0"/>
+          </p:cNvCxnSpPr>
+          <p:nvPr/>
+        </p:nvCxnSpPr>
+        <p:spPr>
+          <a:xfrm>
+            <a:off x="1578917" y="2337427"/>
+            <a:ext cx="2436" cy="590388"/>
+          </a:xfrm>
+          <a:prstGeom prst="straightConnector1">
+            <a:avLst/>
+          </a:prstGeom>
+          <a:ln>
+            <a:tailEnd type="triangle"/>
+          </a:ln>
+        </p:spPr>
+        <p:style>
+          <a:lnRef idx="1">
+            <a:schemeClr val="accent1"/>
+          </a:lnRef>
+          <a:fillRef idx="0">
+            <a:schemeClr val="accent1"/>
+          </a:fillRef>
+          <a:effectRef idx="0">
+            <a:schemeClr val="accent1"/>
+          </a:effectRef>
+          <a:fontRef idx="minor">
+            <a:schemeClr val="tx1"/>
+          </a:fontRef>
+        </p:style>
+      </p:cxnSp>
+      <p:cxnSp>
+        <p:nvCxnSpPr>
+          <p:cNvPr id="65" name="Connector: Curved 64">
+            <a:extLst>
+              <a:ext uri="{FF2B5EF4-FFF2-40B4-BE49-F238E27FC236}">
+                <a16:creationId xmlns:a16="http://schemas.microsoft.com/office/drawing/2014/main" id="{DAA5AFCB-352D-50FE-65EB-F79557F3ECE3}"/>
+              </a:ext>
+            </a:extLst>
+          </p:cNvPr>
+          <p:cNvCxnSpPr>
+            <a:stCxn id="16" idx="1"/>
+            <a:endCxn id="31" idx="3"/>
+          </p:cNvCxnSpPr>
+          <p:nvPr/>
+        </p:nvCxnSpPr>
+        <p:spPr>
+          <a:xfrm rot="10800000" flipV="1">
+            <a:off x="2404581" y="1213544"/>
+            <a:ext cx="1986569" cy="1989438"/>
+          </a:xfrm>
+          <a:prstGeom prst="curvedConnector3">
+            <a:avLst/>
+          </a:prstGeom>
+          <a:ln>
+            <a:tailEnd type="triangle"/>
+          </a:ln>
+        </p:spPr>
+        <p:style>
+          <a:lnRef idx="1">
+            <a:schemeClr val="accent1"/>
+          </a:lnRef>
+          <a:fillRef idx="0">
+            <a:schemeClr val="accent1"/>
+          </a:fillRef>
+          <a:effectRef idx="0">
+            <a:schemeClr val="accent1"/>
+          </a:effectRef>
+          <a:fontRef idx="minor">
+            <a:schemeClr val="tx1"/>
+          </a:fontRef>
+        </p:style>
+      </p:cxnSp>
+      <p:cxnSp>
+        <p:nvCxnSpPr>
+          <p:cNvPr id="75" name="Connector: Curved 74">
+            <a:extLst>
+              <a:ext uri="{FF2B5EF4-FFF2-40B4-BE49-F238E27FC236}">
+                <a16:creationId xmlns:a16="http://schemas.microsoft.com/office/drawing/2014/main" id="{60F85F77-F098-ECD8-0060-6D5D9D72E53D}"/>
+              </a:ext>
+            </a:extLst>
+          </p:cNvPr>
+          <p:cNvCxnSpPr>
+            <a:stCxn id="16" idx="3"/>
+            <a:endCxn id="11" idx="1"/>
+          </p:cNvCxnSpPr>
+          <p:nvPr/>
+        </p:nvCxnSpPr>
+        <p:spPr>
+          <a:xfrm>
+            <a:off x="5851008" y="1213544"/>
+            <a:ext cx="2463230" cy="1879007"/>
+          </a:xfrm>
+          <a:prstGeom prst="curvedConnector3">
+            <a:avLst/>
+          </a:prstGeom>
+          <a:ln>
+            <a:tailEnd type="triangle"/>
+          </a:ln>
+        </p:spPr>
+        <p:style>
+          <a:lnRef idx="1">
+            <a:schemeClr val="accent1"/>
+          </a:lnRef>
+          <a:fillRef idx="0">
+            <a:schemeClr val="accent1"/>
+          </a:fillRef>
+          <a:effectRef idx="0">
+            <a:schemeClr val="accent1"/>
+          </a:effectRef>
+          <a:fontRef idx="minor">
+            <a:schemeClr val="tx1"/>
+          </a:fontRef>
+        </p:style>
+      </p:cxnSp>
+      <p:cxnSp>
+        <p:nvCxnSpPr>
+          <p:cNvPr id="79" name="Connector: Curved 78">
+            <a:extLst>
+              <a:ext uri="{FF2B5EF4-FFF2-40B4-BE49-F238E27FC236}">
+                <a16:creationId xmlns:a16="http://schemas.microsoft.com/office/drawing/2014/main" id="{CF348D0E-61EB-829D-3EDD-06CF7D99DE25}"/>
+              </a:ext>
+            </a:extLst>
+          </p:cNvPr>
+          <p:cNvCxnSpPr>
+            <a:stCxn id="4" idx="0"/>
+          </p:cNvCxnSpPr>
+          <p:nvPr/>
+        </p:nvCxnSpPr>
+        <p:spPr>
+          <a:xfrm rot="16200000" flipV="1">
+            <a:off x="5203652" y="2646971"/>
+            <a:ext cx="1326496" cy="888496"/>
+          </a:xfrm>
+          <a:prstGeom prst="curvedConnector3">
+            <a:avLst/>
+          </a:prstGeom>
+          <a:ln>
+            <a:tailEnd type="triangle"/>
+          </a:ln>
+        </p:spPr>
+        <p:style>
+          <a:lnRef idx="1">
+            <a:schemeClr val="accent2"/>
+          </a:lnRef>
+          <a:fillRef idx="0">
+            <a:schemeClr val="accent2"/>
+          </a:fillRef>
+          <a:effectRef idx="0">
+            <a:schemeClr val="accent2"/>
+          </a:effectRef>
+          <a:fontRef idx="minor">
+            <a:schemeClr val="tx1"/>
+          </a:fontRef>
+        </p:style>
+      </p:cxnSp>
+      <p:cxnSp>
+        <p:nvCxnSpPr>
+          <p:cNvPr id="81" name="Connector: Curved 80">
+            <a:extLst>
+              <a:ext uri="{FF2B5EF4-FFF2-40B4-BE49-F238E27FC236}">
+                <a16:creationId xmlns:a16="http://schemas.microsoft.com/office/drawing/2014/main" id="{39CD289A-A097-869C-8B03-BFE598A8A342}"/>
+              </a:ext>
+            </a:extLst>
+          </p:cNvPr>
+          <p:cNvCxnSpPr>
+            <a:stCxn id="4" idx="3"/>
+            <a:endCxn id="24" idx="1"/>
+          </p:cNvCxnSpPr>
+          <p:nvPr/>
+        </p:nvCxnSpPr>
+        <p:spPr>
+          <a:xfrm flipV="1">
+            <a:off x="6836158" y="1836355"/>
+            <a:ext cx="1758256" cy="2193279"/>
+          </a:xfrm>
+          <a:prstGeom prst="curvedConnector3">
+            <a:avLst/>
+          </a:prstGeom>
+          <a:ln>
+            <a:tailEnd type="triangle"/>
+          </a:ln>
+        </p:spPr>
+        <p:style>
+          <a:lnRef idx="1">
+            <a:schemeClr val="accent2"/>
+          </a:lnRef>
+          <a:fillRef idx="0">
+            <a:schemeClr val="accent2"/>
+          </a:fillRef>
+          <a:effectRef idx="0">
+            <a:schemeClr val="accent2"/>
+          </a:effectRef>
+          <a:fontRef idx="minor">
+            <a:schemeClr val="tx1"/>
+          </a:fontRef>
+        </p:style>
+      </p:cxnSp>
+      <p:cxnSp>
+        <p:nvCxnSpPr>
+          <p:cNvPr id="83" name="Connector: Curved 82">
+            <a:extLst>
+              <a:ext uri="{FF2B5EF4-FFF2-40B4-BE49-F238E27FC236}">
+                <a16:creationId xmlns:a16="http://schemas.microsoft.com/office/drawing/2014/main" id="{C2B5B52F-B520-C161-541C-6CF27BA74DC1}"/>
+              </a:ext>
+            </a:extLst>
+          </p:cNvPr>
+          <p:cNvCxnSpPr>
+            <a:stCxn id="4" idx="1"/>
+            <a:endCxn id="12" idx="3"/>
+          </p:cNvCxnSpPr>
+          <p:nvPr/>
+        </p:nvCxnSpPr>
+        <p:spPr>
+          <a:xfrm rot="10800000">
+            <a:off x="2402145" y="2062262"/>
+            <a:ext cx="3383993" cy="1967373"/>
+          </a:xfrm>
+          <a:prstGeom prst="curvedConnector3">
+            <a:avLst/>
+          </a:prstGeom>
+          <a:ln>
+            <a:tailEnd type="triangle"/>
+          </a:ln>
+        </p:spPr>
+        <p:style>
+          <a:lnRef idx="1">
+            <a:schemeClr val="accent2"/>
+          </a:lnRef>
+          <a:fillRef idx="0">
+            <a:schemeClr val="accent2"/>
+          </a:fillRef>
+          <a:effectRef idx="0">
+            <a:schemeClr val="accent2"/>
+          </a:effectRef>
+          <a:fontRef idx="minor">
+            <a:schemeClr val="tx1"/>
+          </a:fontRef>
+        </p:style>
+      </p:cxnSp>
     </p:spTree>
     <p:extLst>
       <p:ext uri="{BB962C8B-B14F-4D97-AF65-F5344CB8AC3E}">
@@ -4511,4 +5678,299 @@
     </a:ext>
   </a:extLst>
 </a:theme>
+</file>
+
+<file path=ppt/theme/theme2.xml><?xml version="1.0" encoding="utf-8"?>
+<a:theme xmlns:a="http://schemas.openxmlformats.org/drawingml/2006/main" name="Office Theme">
+  <a:themeElements>
+    <a:clrScheme name="Office">
+      <a:dk1>
+        <a:sysClr val="windowText" lastClr="000000"/>
+      </a:dk1>
+      <a:lt1>
+        <a:sysClr val="window" lastClr="FFFFFF"/>
+      </a:lt1>
+      <a:dk2>
+        <a:srgbClr val="44546A"/>
+      </a:dk2>
+      <a:lt2>
+        <a:srgbClr val="E7E6E6"/>
+      </a:lt2>
+      <a:accent1>
+        <a:srgbClr val="4472C4"/>
+      </a:accent1>
+      <a:accent2>
+        <a:srgbClr val="ED7D31"/>
+      </a:accent2>
+      <a:accent3>
+        <a:srgbClr val="A5A5A5"/>
+      </a:accent3>
+      <a:accent4>
+        <a:srgbClr val="FFC000"/>
+      </a:accent4>
+      <a:accent5>
+        <a:srgbClr val="5B9BD5"/>
+      </a:accent5>
+      <a:accent6>
+        <a:srgbClr val="70AD47"/>
+      </a:accent6>
+      <a:hlink>
+        <a:srgbClr val="0563C1"/>
+      </a:hlink>
+      <a:folHlink>
+        <a:srgbClr val="954F72"/>
+      </a:folHlink>
+    </a:clrScheme>
+    <a:fontScheme name="Office">
+      <a:majorFont>
+        <a:latin typeface="Calibri Light" panose="020F0302020204030204"/>
+        <a:ea typeface=""/>
+        <a:cs typeface=""/>
+        <a:font script="Jpan" typeface="游ゴシック Light"/>
+        <a:font script="Hang" typeface="맑은 고딕"/>
+        <a:font script="Hans" typeface="等线 Light"/>
+        <a:font script="Hant" typeface="新細明體"/>
+        <a:font script="Arab" typeface="Times New Roman"/>
+        <a:font script="Hebr" typeface="Times New Roman"/>
+        <a:font script="Thai" typeface="Angsana New"/>
+        <a:font script="Ethi" typeface="Nyala"/>
+        <a:font script="Beng" typeface="Vrinda"/>
+        <a:font script="Gujr" typeface="Shruti"/>
+        <a:font script="Khmr" typeface="MoolBoran"/>
+        <a:font script="Knda" typeface="Tunga"/>
+        <a:font script="Guru" typeface="Raavi"/>
+        <a:font script="Cans" typeface="Euphemia"/>
+        <a:font script="Cher" typeface="Plantagenet Cherokee"/>
+        <a:font script="Yiii" typeface="Microsoft Yi Baiti"/>
+        <a:font script="Tibt" typeface="Microsoft Himalaya"/>
+        <a:font script="Thaa" typeface="MV Boli"/>
+        <a:font script="Deva" typeface="Mangal"/>
+        <a:font script="Telu" typeface="Gautami"/>
+        <a:font script="Taml" typeface="Latha"/>
+        <a:font script="Syrc" typeface="Estrangelo Edessa"/>
+        <a:font script="Orya" typeface="Kalinga"/>
+        <a:font script="Mlym" typeface="Kartika"/>
+        <a:font script="Laoo" typeface="DokChampa"/>
+        <a:font script="Sinh" typeface="Iskoola Pota"/>
+        <a:font script="Mong" typeface="Mongolian Baiti"/>
+        <a:font script="Viet" typeface="Times New Roman"/>
+        <a:font script="Uigh" typeface="Microsoft Uighur"/>
+        <a:font script="Geor" typeface="Sylfaen"/>
+        <a:font script="Armn" typeface="Arial"/>
+        <a:font script="Bugi" typeface="Leelawadee UI"/>
+        <a:font script="Bopo" typeface="Microsoft JhengHei"/>
+        <a:font script="Java" typeface="Javanese Text"/>
+        <a:font script="Lisu" typeface="Segoe UI"/>
+        <a:font script="Mymr" typeface="Myanmar Text"/>
+        <a:font script="Nkoo" typeface="Ebrima"/>
+        <a:font script="Olck" typeface="Nirmala UI"/>
+        <a:font script="Osma" typeface="Ebrima"/>
+        <a:font script="Phag" typeface="Phagspa"/>
+        <a:font script="Syrn" typeface="Estrangelo Edessa"/>
+        <a:font script="Syrj" typeface="Estrangelo Edessa"/>
+        <a:font script="Syre" typeface="Estrangelo Edessa"/>
+        <a:font script="Sora" typeface="Nirmala UI"/>
+        <a:font script="Tale" typeface="Microsoft Tai Le"/>
+        <a:font script="Talu" typeface="Microsoft New Tai Lue"/>
+        <a:font script="Tfng" typeface="Ebrima"/>
+      </a:majorFont>
+      <a:minorFont>
+        <a:latin typeface="Calibri" panose="020F0502020204030204"/>
+        <a:ea typeface=""/>
+        <a:cs typeface=""/>
+        <a:font script="Jpan" typeface="游ゴシック"/>
+        <a:font script="Hang" typeface="맑은 고딕"/>
+        <a:font script="Hans" typeface="等线"/>
+        <a:font script="Hant" typeface="新細明體"/>
+        <a:font script="Arab" typeface="Arial"/>
+        <a:font script="Hebr" typeface="Arial"/>
+        <a:font script="Thai" typeface="Cordia New"/>
+        <a:font script="Ethi" typeface="Nyala"/>
+        <a:font script="Beng" typeface="Vrinda"/>
+        <a:font script="Gujr" typeface="Shruti"/>
+        <a:font script="Khmr" typeface="DaunPenh"/>
+        <a:font script="Knda" typeface="Tunga"/>
+        <a:font script="Guru" typeface="Raavi"/>
+        <a:font script="Cans" typeface="Euphemia"/>
+        <a:font script="Cher" typeface="Plantagenet Cherokee"/>
+        <a:font script="Yiii" typeface="Microsoft Yi Baiti"/>
+        <a:font script="Tibt" typeface="Microsoft Himalaya"/>
+        <a:font script="Thaa" typeface="MV Boli"/>
+        <a:font script="Deva" typeface="Mangal"/>
+        <a:font script="Telu" typeface="Gautami"/>
+        <a:font script="Taml" typeface="Latha"/>
+        <a:font script="Syrc" typeface="Estrangelo Edessa"/>
+        <a:font script="Orya" typeface="Kalinga"/>
+        <a:font script="Mlym" typeface="Kartika"/>
+        <a:font script="Laoo" typeface="DokChampa"/>
+        <a:font script="Sinh" typeface="Iskoola Pota"/>
+        <a:font script="Mong" typeface="Mongolian Baiti"/>
+        <a:font script="Viet" typeface="Arial"/>
+        <a:font script="Uigh" typeface="Microsoft Uighur"/>
+        <a:font script="Geor" typeface="Sylfaen"/>
+        <a:font script="Armn" typeface="Arial"/>
+        <a:font script="Bugi" typeface="Leelawadee UI"/>
+        <a:font script="Bopo" typeface="Microsoft JhengHei"/>
+        <a:font script="Java" typeface="Javanese Text"/>
+        <a:font script="Lisu" typeface="Segoe UI"/>
+        <a:font script="Mymr" typeface="Myanmar Text"/>
+        <a:font script="Nkoo" typeface="Ebrima"/>
+        <a:font script="Olck" typeface="Nirmala UI"/>
+        <a:font script="Osma" typeface="Ebrima"/>
+        <a:font script="Phag" typeface="Phagspa"/>
+        <a:font script="Syrn" typeface="Estrangelo Edessa"/>
+        <a:font script="Syrj" typeface="Estrangelo Edessa"/>
+        <a:font script="Syre" typeface="Estrangelo Edessa"/>
+        <a:font script="Sora" typeface="Nirmala UI"/>
+        <a:font script="Tale" typeface="Microsoft Tai Le"/>
+        <a:font script="Talu" typeface="Microsoft New Tai Lue"/>
+        <a:font script="Tfng" typeface="Ebrima"/>
+      </a:minorFont>
+    </a:fontScheme>
+    <a:fmtScheme name="Office">
+      <a:fillStyleLst>
+        <a:solidFill>
+          <a:schemeClr val="phClr"/>
+        </a:solidFill>
+        <a:gradFill rotWithShape="1">
+          <a:gsLst>
+            <a:gs pos="0">
+              <a:schemeClr val="phClr">
+                <a:lumMod val="110000"/>
+                <a:satMod val="105000"/>
+                <a:tint val="67000"/>
+              </a:schemeClr>
+            </a:gs>
+            <a:gs pos="50000">
+              <a:schemeClr val="phClr">
+                <a:lumMod val="105000"/>
+                <a:satMod val="103000"/>
+                <a:tint val="73000"/>
+              </a:schemeClr>
+            </a:gs>
+            <a:gs pos="100000">
+              <a:schemeClr val="phClr">
+                <a:lumMod val="105000"/>
+                <a:satMod val="109000"/>
+                <a:tint val="81000"/>
+              </a:schemeClr>
+            </a:gs>
+          </a:gsLst>
+          <a:lin ang="5400000" scaled="0"/>
+        </a:gradFill>
+        <a:gradFill rotWithShape="1">
+          <a:gsLst>
+            <a:gs pos="0">
+              <a:schemeClr val="phClr">
+                <a:satMod val="103000"/>
+                <a:lumMod val="102000"/>
+                <a:tint val="94000"/>
+              </a:schemeClr>
+            </a:gs>
+            <a:gs pos="50000">
+              <a:schemeClr val="phClr">
+                <a:satMod val="110000"/>
+                <a:lumMod val="100000"/>
+                <a:shade val="100000"/>
+              </a:schemeClr>
+            </a:gs>
+            <a:gs pos="100000">
+              <a:schemeClr val="phClr">
+                <a:lumMod val="99000"/>
+                <a:satMod val="120000"/>
+                <a:shade val="78000"/>
+              </a:schemeClr>
+            </a:gs>
+          </a:gsLst>
+          <a:lin ang="5400000" scaled="0"/>
+        </a:gradFill>
+      </a:fillStyleLst>
+      <a:lnStyleLst>
+        <a:ln w="6350" cap="flat" cmpd="sng" algn="ctr">
+          <a:solidFill>
+            <a:schemeClr val="phClr"/>
+          </a:solidFill>
+          <a:prstDash val="solid"/>
+          <a:miter lim="800000"/>
+        </a:ln>
+        <a:ln w="12700" cap="flat" cmpd="sng" algn="ctr">
+          <a:solidFill>
+            <a:schemeClr val="phClr"/>
+          </a:solidFill>
+          <a:prstDash val="solid"/>
+          <a:miter lim="800000"/>
+        </a:ln>
+        <a:ln w="19050" cap="flat" cmpd="sng" algn="ctr">
+          <a:solidFill>
+            <a:schemeClr val="phClr"/>
+          </a:solidFill>
+          <a:prstDash val="solid"/>
+          <a:miter lim="800000"/>
+        </a:ln>
+      </a:lnStyleLst>
+      <a:effectStyleLst>
+        <a:effectStyle>
+          <a:effectLst/>
+        </a:effectStyle>
+        <a:effectStyle>
+          <a:effectLst/>
+        </a:effectStyle>
+        <a:effectStyle>
+          <a:effectLst>
+            <a:outerShdw blurRad="57150" dist="19050" dir="5400000" algn="ctr" rotWithShape="0">
+              <a:srgbClr val="000000">
+                <a:alpha val="63000"/>
+              </a:srgbClr>
+            </a:outerShdw>
+          </a:effectLst>
+        </a:effectStyle>
+      </a:effectStyleLst>
+      <a:bgFillStyleLst>
+        <a:solidFill>
+          <a:schemeClr val="phClr"/>
+        </a:solidFill>
+        <a:solidFill>
+          <a:schemeClr val="phClr">
+            <a:tint val="95000"/>
+            <a:satMod val="170000"/>
+          </a:schemeClr>
+        </a:solidFill>
+        <a:gradFill rotWithShape="1">
+          <a:gsLst>
+            <a:gs pos="0">
+              <a:schemeClr val="phClr">
+                <a:tint val="93000"/>
+                <a:satMod val="150000"/>
+                <a:shade val="98000"/>
+                <a:lumMod val="102000"/>
+              </a:schemeClr>
+            </a:gs>
+            <a:gs pos="50000">
+              <a:schemeClr val="phClr">
+                <a:tint val="98000"/>
+                <a:satMod val="130000"/>
+                <a:shade val="90000"/>
+                <a:lumMod val="103000"/>
+              </a:schemeClr>
+            </a:gs>
+            <a:gs pos="100000">
+              <a:schemeClr val="phClr">
+                <a:shade val="63000"/>
+                <a:satMod val="120000"/>
+              </a:schemeClr>
+            </a:gs>
+          </a:gsLst>
+          <a:lin ang="5400000" scaled="0"/>
+        </a:gradFill>
+      </a:bgFillStyleLst>
+    </a:fmtScheme>
+  </a:themeElements>
+  <a:objectDefaults/>
+  <a:extraClrSchemeLst/>
+  <a:extLst>
+    <a:ext uri="{05A4C25C-085E-4340-85A3-A5531E510DB2}">
+      <thm15:themeFamily xmlns:thm15="http://schemas.microsoft.com/office/thememl/2012/main" name="Office Theme" id="{62F939B6-93AF-4DB8-9C6B-D6C7DFDC589F}" vid="{4A3C46E8-61CC-4603-A589-7422A47A8E4A}"/>
+    </a:ext>
+  </a:extLst>
+</a:theme>
 </file>
</xml_diff>